<commit_message>
Add presentation files of the final colloquium
</commit_message>
<xml_diff>
--- a/Presentations/210827 YSSP (IIASA) - final colloquium.pptx
+++ b/Presentations/210827 YSSP (IIASA) - final colloquium.pptx
@@ -238,7 +238,7 @@
           <a:p>
             <a:fld id="{8362D56F-4014-E440-B414-1949875DC54A}" type="datetimeFigureOut">
               <a:rPr lang="en-US" smtClean="0"/>
-              <a:t>8/23/2021</a:t>
+              <a:t>8/25/2021</a:t>
             </a:fld>
             <a:endParaRPr lang="en-US"/>
           </a:p>
@@ -415,7 +415,7 @@
           <a:p>
             <a:fld id="{1EAC332E-8893-FE4E-9A25-93BB30EFA0DA}" type="datetimeFigureOut">
               <a:rPr lang="en-US" smtClean="0"/>
-              <a:t>8/23/2021</a:t>
+              <a:t>8/25/2021</a:t>
             </a:fld>
             <a:endParaRPr lang="en-US"/>
           </a:p>
@@ -894,6 +894,106 @@
           <a:bodyPr/>
           <a:lstStyle/>
           <a:p>
+            <a:pPr marL="0" marR="0" lvl="0" indent="0" algn="l" defTabSz="914400" rtl="0" eaLnBrk="1" fontAlgn="auto" latinLnBrk="0" hangingPunct="1">
+              <a:lnSpc>
+                <a:spcPct val="100000"/>
+              </a:lnSpc>
+              <a:spcBef>
+                <a:spcPts val="0"/>
+              </a:spcBef>
+              <a:spcAft>
+                <a:spcPts val="0"/>
+              </a:spcAft>
+              <a:buClrTx/>
+              <a:buSzTx/>
+              <a:buFontTx/>
+              <a:buNone/>
+              <a:tabLst/>
+              <a:defRPr/>
+            </a:pPr>
+            <a:r>
+              <a:rPr lang="en-US" sz="1200" kern="1200" dirty="0" smtClean="0">
+                <a:solidFill>
+                  <a:schemeClr val="tx1"/>
+                </a:solidFill>
+                <a:effectLst/>
+                <a:latin typeface="+mn-lt"/>
+                <a:ea typeface="+mn-ea"/>
+                <a:cs typeface="+mn-cs"/>
+              </a:rPr>
+              <a:t>I start this presentation with a brief overview of the European heating sector. So far, fossil-fuel based heat generation dominates the supply</a:t>
+            </a:r>
+            <a:r>
+              <a:rPr lang="en-US" sz="1200" kern="1200" baseline="0" dirty="0" smtClean="0">
+                <a:solidFill>
+                  <a:schemeClr val="tx1"/>
+                </a:solidFill>
+                <a:effectLst/>
+                <a:latin typeface="+mn-lt"/>
+                <a:ea typeface="+mn-ea"/>
+                <a:cs typeface="+mn-cs"/>
+              </a:rPr>
+              <a:t> of heat service needs</a:t>
+            </a:r>
+            <a:r>
+              <a:rPr lang="en-US" sz="1200" kern="1200" dirty="0" smtClean="0">
+                <a:solidFill>
+                  <a:schemeClr val="tx1"/>
+                </a:solidFill>
+                <a:effectLst/>
+                <a:latin typeface="+mn-lt"/>
+                <a:ea typeface="+mn-ea"/>
+                <a:cs typeface="+mn-cs"/>
+              </a:rPr>
+              <a:t>. The share of renewable energy in the provision of heating and cooling services is only just above 20% on average in all EU member states. In Austria, it is 34%. However, fossil fuels continue to dominant here as well. To be more precise, 1.4 million dwellings are heated with natural gas or oil in Austria today. Switching these heating systems to renewable energy by 2050, retrofitting 50 thousand end-user devices per year or more than 130 per day becomes necessary. To achieve this goal, we need not only  sustainable decentralized heating systems, but also a massive expansion of centralized heating and cooling networks. In particular, district heating networks will play a crucial role as they (</a:t>
+            </a:r>
+            <a:r>
+              <a:rPr lang="en-US" sz="1200" kern="1200" dirty="0" err="1" smtClean="0">
+                <a:solidFill>
+                  <a:schemeClr val="tx1"/>
+                </a:solidFill>
+                <a:effectLst/>
+                <a:latin typeface="+mn-lt"/>
+                <a:ea typeface="+mn-ea"/>
+                <a:cs typeface="+mn-cs"/>
+              </a:rPr>
+              <a:t>i</a:t>
+            </a:r>
+            <a:r>
+              <a:rPr lang="en-US" sz="1200" kern="1200" dirty="0" smtClean="0">
+                <a:solidFill>
+                  <a:schemeClr val="tx1"/>
+                </a:solidFill>
+                <a:effectLst/>
+                <a:latin typeface="+mn-lt"/>
+                <a:ea typeface="+mn-ea"/>
+                <a:cs typeface="+mn-cs"/>
+              </a:rPr>
+              <a:t>) ensure a highly efficient usage of renewable heat sources, such as biomass/waste and hydrogen; (ii) give us the opportunity to achieve significant retrofitting rates by high connection rates; and (iii) can unburden the electricity sector as we expect high electrification rates of different energy service needs,</a:t>
+            </a:r>
+            <a:r>
+              <a:rPr lang="en-US" sz="1200" kern="1200" baseline="0" dirty="0" smtClean="0">
+                <a:solidFill>
+                  <a:schemeClr val="tx1"/>
+                </a:solidFill>
+                <a:effectLst/>
+                <a:latin typeface="+mn-lt"/>
+                <a:ea typeface="+mn-ea"/>
+                <a:cs typeface="+mn-cs"/>
+              </a:rPr>
+              <a:t> such as in the transport and industry sector. </a:t>
+            </a:r>
+            <a:endParaRPr lang="en-US" sz="1200" kern="1200" dirty="0" smtClean="0">
+              <a:solidFill>
+                <a:schemeClr val="tx1"/>
+              </a:solidFill>
+              <a:effectLst/>
+              <a:latin typeface="+mn-lt"/>
+              <a:ea typeface="+mn-ea"/>
+              <a:cs typeface="+mn-cs"/>
+            </a:endParaRPr>
+          </a:p>
+          <a:p>
             <a:endParaRPr lang="en-US" dirty="0"/>
           </a:p>
         </p:txBody>
@@ -978,7 +1078,35 @@
           <a:bodyPr/>
           <a:lstStyle/>
           <a:p>
-            <a:endParaRPr lang="en-US" dirty="0"/>
+            <a:pPr marL="0" marR="0" lvl="0" indent="0" algn="l" defTabSz="914400" rtl="0" eaLnBrk="1" fontAlgn="auto" latinLnBrk="0" hangingPunct="1">
+              <a:lnSpc>
+                <a:spcPct val="100000"/>
+              </a:lnSpc>
+              <a:spcBef>
+                <a:spcPts val="0"/>
+              </a:spcBef>
+              <a:spcAft>
+                <a:spcPts val="0"/>
+              </a:spcAft>
+              <a:buClrTx/>
+              <a:buSzTx/>
+              <a:buFontTx/>
+              <a:buNone/>
+              <a:tabLst/>
+              <a:defRPr/>
+            </a:pPr>
+            <a:r>
+              <a:rPr lang="en-US" sz="1200" kern="1200" dirty="0" smtClean="0">
+                <a:solidFill>
+                  <a:schemeClr val="tx1"/>
+                </a:solidFill>
+                <a:effectLst/>
+                <a:latin typeface="+mn-lt"/>
+                <a:ea typeface="+mn-ea"/>
+                <a:cs typeface="+mn-cs"/>
+              </a:rPr>
+              <a:t>Against this background, the core objective of this work is the downscaling of decarbonization scenarios of the heating sector, taking into account the infrastructure/network requirements of heat generation technologies/sources, from the country to the community level. In particular, the prioritized preference of heat sources in centralized heat networks plays a crucial role, ensuring highly efficient usage of heat sources. Moreover, the assessment of centralized or district heating networks using heat density as a criterion is important in this analysis. We conduct an Austrian case study, downscaling cost-minimizing heat generation portfolios 2050, obtained from the large numerical energy system model GENeSYS-MOD, from the country to the grid level.  </a:t>
+            </a:r>
           </a:p>
         </p:txBody>
       </p:sp>
@@ -1062,6 +1190,133 @@
           <a:bodyPr/>
           <a:lstStyle/>
           <a:p>
+            <a:pPr marL="0" marR="0" lvl="0" indent="0" algn="l" defTabSz="914400" rtl="0" eaLnBrk="1" fontAlgn="auto" latinLnBrk="0" hangingPunct="1">
+              <a:lnSpc>
+                <a:spcPct val="100000"/>
+              </a:lnSpc>
+              <a:spcBef>
+                <a:spcPts val="0"/>
+              </a:spcBef>
+              <a:spcAft>
+                <a:spcPts val="0"/>
+              </a:spcAft>
+              <a:buClrTx/>
+              <a:buSzTx/>
+              <a:buFontTx/>
+              <a:buNone/>
+              <a:tabLst/>
+              <a:defRPr/>
+            </a:pPr>
+            <a:r>
+              <a:rPr lang="en-US" sz="1200" kern="1200" dirty="0" smtClean="0">
+                <a:solidFill>
+                  <a:schemeClr val="tx1"/>
+                </a:solidFill>
+                <a:effectLst/>
+                <a:latin typeface="+mn-lt"/>
+                <a:ea typeface="+mn-ea"/>
+                <a:cs typeface="+mn-cs"/>
+              </a:rPr>
+              <a:t>Here, the applied methodology is briefly explained. First, as we focus here on spatial downscaling, we have to define</a:t>
+            </a:r>
+            <a:r>
+              <a:rPr lang="en-US" sz="1200" kern="1200" baseline="0" dirty="0" smtClean="0">
+                <a:solidFill>
+                  <a:schemeClr val="tx1"/>
+                </a:solidFill>
+                <a:effectLst/>
+                <a:latin typeface="+mn-lt"/>
+                <a:ea typeface="+mn-ea"/>
+                <a:cs typeface="+mn-cs"/>
+              </a:rPr>
+              <a:t> </a:t>
+            </a:r>
+            <a:r>
+              <a:rPr lang="en-US" sz="1200" kern="1200" dirty="0" smtClean="0">
+                <a:solidFill>
+                  <a:schemeClr val="tx1"/>
+                </a:solidFill>
+                <a:effectLst/>
+                <a:latin typeface="+mn-lt"/>
+                <a:ea typeface="+mn-ea"/>
+                <a:cs typeface="+mn-cs"/>
+              </a:rPr>
+              <a:t>different spatial levels. Therefore,</a:t>
+            </a:r>
+            <a:r>
+              <a:rPr lang="en-US" sz="1200" kern="1200" baseline="0" dirty="0" smtClean="0">
+                <a:solidFill>
+                  <a:schemeClr val="tx1"/>
+                </a:solidFill>
+                <a:effectLst/>
+                <a:latin typeface="+mn-lt"/>
+                <a:ea typeface="+mn-ea"/>
+                <a:cs typeface="+mn-cs"/>
+              </a:rPr>
+              <a:t> we </a:t>
+            </a:r>
+            <a:r>
+              <a:rPr lang="en-US" sz="1200" kern="1200" dirty="0" smtClean="0">
+                <a:solidFill>
+                  <a:schemeClr val="tx1"/>
+                </a:solidFill>
+                <a:effectLst/>
+                <a:latin typeface="+mn-lt"/>
+                <a:ea typeface="+mn-ea"/>
+                <a:cs typeface="+mn-cs"/>
+              </a:rPr>
+              <a:t>use the Nomenclature of Territorial Units for Statistics (NUTS) for different spatial granularities. The table at the top shows the different NUTS classifications and some examples for Austria. For example NUTS0 corresponds to the country level. In our study, we use the three gray-marked NUTS classifications NUTS0, NUTS3 and LAU. An</a:t>
+            </a:r>
+            <a:r>
+              <a:rPr lang="en-US" sz="1200" kern="1200" baseline="0" dirty="0" smtClean="0">
+                <a:solidFill>
+                  <a:schemeClr val="tx1"/>
+                </a:solidFill>
+                <a:effectLst/>
+                <a:latin typeface="+mn-lt"/>
+                <a:ea typeface="+mn-ea"/>
+                <a:cs typeface="+mn-cs"/>
+              </a:rPr>
+              <a:t> example for a NUTS3 region in Austria is the area Linz-Wels in Upper Austria and includes a population of around 500 thousand people. The LAU level represents small communities, for example the area of </a:t>
+            </a:r>
+            <a:r>
+              <a:rPr lang="en-US" sz="1200" kern="1200" baseline="0" dirty="0" err="1" smtClean="0">
+                <a:solidFill>
+                  <a:schemeClr val="tx1"/>
+                </a:solidFill>
+                <a:effectLst/>
+                <a:latin typeface="+mn-lt"/>
+                <a:ea typeface="+mn-ea"/>
+                <a:cs typeface="+mn-cs"/>
+              </a:rPr>
+              <a:t>Enns</a:t>
+            </a:r>
+            <a:r>
+              <a:rPr lang="en-US" sz="1200" kern="1200" baseline="0" dirty="0" smtClean="0">
+                <a:solidFill>
+                  <a:schemeClr val="tx1"/>
+                </a:solidFill>
+                <a:effectLst/>
+                <a:latin typeface="+mn-lt"/>
+                <a:ea typeface="+mn-ea"/>
+                <a:cs typeface="+mn-cs"/>
+              </a:rPr>
+              <a:t> with a population of 11 thousand. The country of Austria is split into more than 2 thousand of those communities. </a:t>
+            </a:r>
+            <a:r>
+              <a:rPr lang="en-US" sz="1200" kern="1200" dirty="0" smtClean="0">
+                <a:solidFill>
+                  <a:schemeClr val="tx1"/>
+                </a:solidFill>
+                <a:effectLst/>
+                <a:latin typeface="+mn-lt"/>
+                <a:ea typeface="+mn-ea"/>
+                <a:cs typeface="+mn-cs"/>
+              </a:rPr>
+              <a:t>We use three different scenario-independent downscaling techniques. First, proportional downscaling, using population as a proxy as a reference and well-established downscaling technique. Second, a sequential downscaling algorithm, using population density and infrastructure requirements of heat sources as a criterion and an iterative downscaling algorithm, which bases on graph-theory benchmarking. </a:t>
+            </a:r>
+          </a:p>
+          <a:p>
             <a:endParaRPr lang="en-US" baseline="0" dirty="0" smtClean="0"/>
           </a:p>
         </p:txBody>
@@ -1146,7 +1401,128 @@
           <a:bodyPr/>
           <a:lstStyle/>
           <a:p>
-            <a:endParaRPr lang="en-US" baseline="0" dirty="0" smtClean="0"/>
+            <a:pPr marL="0" marR="0" lvl="0" indent="0" algn="l" defTabSz="914400" rtl="0" eaLnBrk="1" fontAlgn="auto" latinLnBrk="0" hangingPunct="1">
+              <a:lnSpc>
+                <a:spcPct val="100000"/>
+              </a:lnSpc>
+              <a:spcBef>
+                <a:spcPts val="0"/>
+              </a:spcBef>
+              <a:spcAft>
+                <a:spcPts val="0"/>
+              </a:spcAft>
+              <a:buClrTx/>
+              <a:buSzTx/>
+              <a:buFontTx/>
+              <a:buNone/>
+              <a:tabLst/>
+              <a:defRPr/>
+            </a:pPr>
+            <a:r>
+              <a:rPr lang="en-US" sz="1200" kern="1200" dirty="0" smtClean="0">
+                <a:solidFill>
+                  <a:schemeClr val="tx1"/>
+                </a:solidFill>
+                <a:effectLst/>
+                <a:latin typeface="+mn-lt"/>
+                <a:ea typeface="+mn-ea"/>
+                <a:cs typeface="+mn-cs"/>
+              </a:rPr>
+              <a:t>We analyze four different decarbonization scenarios of the European energy system considering the 1.5/2°C climate targets. The scenarios are developed in the H2020 project openENTRANCE and cover a wide range of future developments and uncertainties. The four scenarios are named: Directed Transition, Societal Commitment, Techno-Friendly, and Gradual Development. The underlying concept of the scenarios is a three-dimensional</a:t>
+            </a:r>
+            <a:r>
+              <a:rPr lang="en-US" sz="1200" kern="1200" baseline="0" dirty="0" smtClean="0">
+                <a:solidFill>
+                  <a:schemeClr val="tx1"/>
+                </a:solidFill>
+                <a:effectLst/>
+                <a:latin typeface="+mn-lt"/>
+                <a:ea typeface="+mn-ea"/>
+                <a:cs typeface="+mn-cs"/>
+              </a:rPr>
+              <a:t> space, whereby each </a:t>
+            </a:r>
+            <a:r>
+              <a:rPr lang="en-US" sz="1200" kern="1200" dirty="0" smtClean="0">
+                <a:solidFill>
+                  <a:schemeClr val="tx1"/>
+                </a:solidFill>
+                <a:effectLst/>
+                <a:latin typeface="+mn-lt"/>
+                <a:ea typeface="+mn-ea"/>
+                <a:cs typeface="+mn-cs"/>
+              </a:rPr>
+              <a:t>scenario emphasizes a strong</a:t>
+            </a:r>
+            <a:r>
+              <a:rPr lang="en-US" sz="1200" kern="1200" baseline="0" dirty="0" smtClean="0">
+                <a:solidFill>
+                  <a:schemeClr val="tx1"/>
+                </a:solidFill>
+                <a:effectLst/>
+                <a:latin typeface="+mn-lt"/>
+                <a:ea typeface="+mn-ea"/>
+                <a:cs typeface="+mn-cs"/>
+              </a:rPr>
+              <a:t> sustainable development of one dimension. </a:t>
+            </a:r>
+            <a:r>
+              <a:rPr lang="en-US" sz="1200" kern="1200" dirty="0" smtClean="0">
+                <a:solidFill>
+                  <a:schemeClr val="tx1"/>
+                </a:solidFill>
+                <a:effectLst/>
+                <a:latin typeface="+mn-lt"/>
+                <a:ea typeface="+mn-ea"/>
+                <a:cs typeface="+mn-cs"/>
+              </a:rPr>
+              <a:t>For example, the Directed Transition scenario (a) considers strong</a:t>
+            </a:r>
+            <a:r>
+              <a:rPr lang="en-US" sz="1200" kern="1200" baseline="0" dirty="0" smtClean="0">
+                <a:solidFill>
+                  <a:schemeClr val="tx1"/>
+                </a:solidFill>
+                <a:effectLst/>
+                <a:latin typeface="+mn-lt"/>
+                <a:ea typeface="+mn-ea"/>
+                <a:cs typeface="+mn-cs"/>
+              </a:rPr>
+              <a:t> policy incentives enabling the sustainable transition. In contrast, the T</a:t>
+            </a:r>
+            <a:r>
+              <a:rPr lang="en-US" sz="1200" kern="1200" dirty="0" smtClean="0">
+                <a:solidFill>
+                  <a:schemeClr val="tx1"/>
+                </a:solidFill>
+                <a:effectLst/>
+                <a:latin typeface="+mn-lt"/>
+                <a:ea typeface="+mn-ea"/>
+                <a:cs typeface="+mn-cs"/>
+              </a:rPr>
+              <a:t>echno-friendly scenario takes into account a significant market-driven breakthrough of renewables</a:t>
+            </a:r>
+            <a:r>
+              <a:rPr lang="en-US" sz="1200" kern="1200" baseline="0" dirty="0" smtClean="0">
+                <a:solidFill>
+                  <a:schemeClr val="tx1"/>
+                </a:solidFill>
+                <a:effectLst/>
+                <a:latin typeface="+mn-lt"/>
+                <a:ea typeface="+mn-ea"/>
+                <a:cs typeface="+mn-cs"/>
+              </a:rPr>
+              <a:t> without being dependent on energy policy measures. </a:t>
+            </a:r>
+            <a:endParaRPr lang="en-US" sz="1200" kern="1200" dirty="0" smtClean="0">
+              <a:solidFill>
+                <a:schemeClr val="tx1"/>
+              </a:solidFill>
+              <a:effectLst/>
+              <a:latin typeface="+mn-lt"/>
+              <a:ea typeface="+mn-ea"/>
+              <a:cs typeface="+mn-cs"/>
+            </a:endParaRPr>
           </a:p>
         </p:txBody>
       </p:sp>
@@ -1230,7 +1606,80 @@
           <a:bodyPr/>
           <a:lstStyle/>
           <a:p>
-            <a:endParaRPr lang="en-US" dirty="0"/>
+            <a:pPr marL="0" marR="0" lvl="0" indent="0" algn="l" defTabSz="914400" rtl="0" eaLnBrk="1" fontAlgn="auto" latinLnBrk="0" hangingPunct="1">
+              <a:lnSpc>
+                <a:spcPct val="100000"/>
+              </a:lnSpc>
+              <a:spcBef>
+                <a:spcPts val="0"/>
+              </a:spcBef>
+              <a:spcAft>
+                <a:spcPts val="0"/>
+              </a:spcAft>
+              <a:buClrTx/>
+              <a:buSzTx/>
+              <a:buFontTx/>
+              <a:buNone/>
+              <a:tabLst/>
+              <a:defRPr/>
+            </a:pPr>
+            <a:r>
+              <a:rPr lang="en-US" sz="1200" kern="1200" dirty="0" smtClean="0">
+                <a:solidFill>
+                  <a:schemeClr val="tx1"/>
+                </a:solidFill>
+                <a:effectLst/>
+                <a:latin typeface="+mn-lt"/>
+                <a:ea typeface="+mn-ea"/>
+                <a:cs typeface="+mn-cs"/>
+              </a:rPr>
+              <a:t>The following four slide present the</a:t>
+            </a:r>
+            <a:r>
+              <a:rPr lang="en-US" sz="1200" kern="1200" baseline="0" dirty="0" smtClean="0">
+                <a:solidFill>
+                  <a:schemeClr val="tx1"/>
+                </a:solidFill>
+                <a:effectLst/>
+                <a:latin typeface="+mn-lt"/>
+                <a:ea typeface="+mn-ea"/>
+                <a:cs typeface="+mn-cs"/>
+              </a:rPr>
+              <a:t> highlights of the generated </a:t>
+            </a:r>
+            <a:r>
+              <a:rPr lang="en-US" sz="1200" kern="1200" dirty="0" smtClean="0">
+                <a:solidFill>
+                  <a:schemeClr val="tx1"/>
+                </a:solidFill>
+                <a:effectLst/>
+                <a:latin typeface="+mn-lt"/>
+                <a:ea typeface="+mn-ea"/>
+                <a:cs typeface="+mn-cs"/>
+              </a:rPr>
+              <a:t>results. First, here we see the heat generation by source on different spatial levels and in the four different scenarios. The heat sources that are prioritized in the district heating network are marked by the blue edge. As you can see, those</a:t>
+            </a:r>
+            <a:r>
+              <a:rPr lang="en-US" sz="1200" kern="1200" baseline="0" dirty="0" smtClean="0">
+                <a:solidFill>
+                  <a:schemeClr val="tx1"/>
+                </a:solidFill>
+                <a:effectLst/>
+                <a:latin typeface="+mn-lt"/>
+                <a:ea typeface="+mn-ea"/>
+                <a:cs typeface="+mn-cs"/>
+              </a:rPr>
+              <a:t> technologies only supply highly populated areas, whereby rural areas are supplied by direct electric heating, small-scale air-sourced heat pumps and heat storage. The graph on the right shows the district heating network topology. Each point represents the quantity of heat demand supplied by the network. The largest network is obtained in the Gradual development scenario at the bottom right, since this scenario considers the less ambitious 2.0°C global warming target and reduces the total heat demand less than the other scenarios. </a:t>
+            </a:r>
+            <a:endParaRPr lang="en-US" sz="1200" kern="1200" dirty="0" smtClean="0">
+              <a:solidFill>
+                <a:schemeClr val="tx1"/>
+              </a:solidFill>
+              <a:effectLst/>
+              <a:latin typeface="+mn-lt"/>
+              <a:ea typeface="+mn-ea"/>
+              <a:cs typeface="+mn-cs"/>
+            </a:endParaRPr>
           </a:p>
         </p:txBody>
       </p:sp>
@@ -1314,6 +1763,133 @@
           <a:bodyPr/>
           <a:lstStyle/>
           <a:p>
+            <a:pPr marL="0" marR="0" lvl="0" indent="0" algn="l" defTabSz="914400" rtl="0" eaLnBrk="1" fontAlgn="auto" latinLnBrk="0" hangingPunct="1">
+              <a:lnSpc>
+                <a:spcPct val="100000"/>
+              </a:lnSpc>
+              <a:spcBef>
+                <a:spcPts val="0"/>
+              </a:spcBef>
+              <a:spcAft>
+                <a:spcPts val="0"/>
+              </a:spcAft>
+              <a:buClrTx/>
+              <a:buSzTx/>
+              <a:buFontTx/>
+              <a:buNone/>
+              <a:tabLst/>
+              <a:defRPr/>
+            </a:pPr>
+            <a:r>
+              <a:rPr lang="en-US" sz="1200" kern="1200" dirty="0" smtClean="0">
+                <a:solidFill>
+                  <a:schemeClr val="tx1"/>
+                </a:solidFill>
+                <a:effectLst/>
+                <a:latin typeface="+mn-lt"/>
+                <a:ea typeface="+mn-ea"/>
+                <a:cs typeface="+mn-cs"/>
+              </a:rPr>
+              <a:t>This </a:t>
+            </a:r>
+            <a:r>
+              <a:rPr lang="en-US" sz="1200" kern="1200" dirty="0" err="1" smtClean="0">
+                <a:solidFill>
+                  <a:schemeClr val="tx1"/>
+                </a:solidFill>
+                <a:effectLst/>
+                <a:latin typeface="+mn-lt"/>
+                <a:ea typeface="+mn-ea"/>
+                <a:cs typeface="+mn-cs"/>
+              </a:rPr>
+              <a:t>heatmap</a:t>
+            </a:r>
+            <a:r>
+              <a:rPr lang="en-US" sz="1200" kern="1200" dirty="0" smtClean="0">
+                <a:solidFill>
+                  <a:schemeClr val="tx1"/>
+                </a:solidFill>
+                <a:effectLst/>
+                <a:latin typeface="+mn-lt"/>
+                <a:ea typeface="+mn-ea"/>
+                <a:cs typeface="+mn-cs"/>
+              </a:rPr>
+              <a:t> shows the potentials of centralized heat networks 2050 in Austria. As you can see, there are centralized heat networks in six NUTS3 regions. The heat demand supplied by the district heating networks varies among the areas and scenarios between 1.5 and almost 8 </a:t>
+            </a:r>
+            <a:r>
+              <a:rPr lang="en-US" sz="1200" kern="1200" dirty="0" err="1" smtClean="0">
+                <a:solidFill>
+                  <a:schemeClr val="tx1"/>
+                </a:solidFill>
+                <a:effectLst/>
+                <a:latin typeface="+mn-lt"/>
+                <a:ea typeface="+mn-ea"/>
+                <a:cs typeface="+mn-cs"/>
+              </a:rPr>
+              <a:t>TWh</a:t>
+            </a:r>
+            <a:r>
+              <a:rPr lang="en-US" sz="1200" kern="1200" dirty="0" smtClean="0">
+                <a:solidFill>
+                  <a:schemeClr val="tx1"/>
+                </a:solidFill>
+                <a:effectLst/>
+                <a:latin typeface="+mn-lt"/>
+                <a:ea typeface="+mn-ea"/>
+                <a:cs typeface="+mn-cs"/>
+              </a:rPr>
+              <a:t>. The other sub-regions</a:t>
+            </a:r>
+            <a:r>
+              <a:rPr lang="en-US" sz="1200" kern="1200" baseline="0" dirty="0" smtClean="0">
+                <a:solidFill>
+                  <a:schemeClr val="tx1"/>
+                </a:solidFill>
+                <a:effectLst/>
+                <a:latin typeface="+mn-lt"/>
+                <a:ea typeface="+mn-ea"/>
+                <a:cs typeface="+mn-cs"/>
+              </a:rPr>
+              <a:t> are supplied by decentralized heating systems as shown in the rural sub-figure on the previous slide. </a:t>
+            </a:r>
+            <a:r>
+              <a:rPr lang="en-US" sz="1200" kern="1200" dirty="0" smtClean="0">
+                <a:solidFill>
+                  <a:schemeClr val="tx1"/>
+                </a:solidFill>
+                <a:effectLst/>
+                <a:latin typeface="+mn-lt"/>
+                <a:ea typeface="+mn-ea"/>
+                <a:cs typeface="+mn-cs"/>
+              </a:rPr>
+              <a:t>However, obtaining a more realistic estimate of district heating networks in the six sub-regions</a:t>
+            </a:r>
+            <a:r>
+              <a:rPr lang="en-US" sz="1200" kern="1200" baseline="0" dirty="0" smtClean="0">
+                <a:solidFill>
+                  <a:schemeClr val="tx1"/>
+                </a:solidFill>
+                <a:effectLst/>
+                <a:latin typeface="+mn-lt"/>
+                <a:ea typeface="+mn-ea"/>
+                <a:cs typeface="+mn-cs"/>
+              </a:rPr>
+              <a:t> </a:t>
+            </a:r>
+            <a:r>
+              <a:rPr lang="en-US" sz="1200" kern="1200" dirty="0" smtClean="0">
+                <a:solidFill>
+                  <a:schemeClr val="tx1"/>
+                </a:solidFill>
+                <a:effectLst/>
+                <a:latin typeface="+mn-lt"/>
+                <a:ea typeface="+mn-ea"/>
+                <a:cs typeface="+mn-cs"/>
+              </a:rPr>
+              <a:t>requires an even finer spatial granularity, as indicated by the orange box. We therefore subjected each of these 6 regions of potential to a further downscaling algorithm that provides more accurate projections of district heating networks based on graph theory benchmarking.</a:t>
+            </a:r>
+          </a:p>
+          <a:p>
             <a:endParaRPr lang="en-US" dirty="0"/>
           </a:p>
         </p:txBody>
@@ -1398,7 +1974,155 @@
           <a:bodyPr/>
           <a:lstStyle/>
           <a:p>
-            <a:endParaRPr lang="en-US" dirty="0"/>
+            <a:pPr marL="0" marR="0" lvl="0" indent="0" algn="l" defTabSz="914400" rtl="0" eaLnBrk="1" fontAlgn="auto" latinLnBrk="0" hangingPunct="1">
+              <a:lnSpc>
+                <a:spcPct val="100000"/>
+              </a:lnSpc>
+              <a:spcBef>
+                <a:spcPts val="0"/>
+              </a:spcBef>
+              <a:spcAft>
+                <a:spcPts val="0"/>
+              </a:spcAft>
+              <a:buClrTx/>
+              <a:buSzTx/>
+              <a:buFontTx/>
+              <a:buNone/>
+              <a:tabLst/>
+              <a:defRPr/>
+            </a:pPr>
+            <a:r>
+              <a:rPr lang="en-US" sz="1200" kern="1200" dirty="0" smtClean="0">
+                <a:solidFill>
+                  <a:schemeClr val="tx1"/>
+                </a:solidFill>
+                <a:effectLst/>
+                <a:latin typeface="+mn-lt"/>
+                <a:ea typeface="+mn-ea"/>
+                <a:cs typeface="+mn-cs"/>
+              </a:rPr>
+              <a:t>The example of the NUTS3 region in the orange box is illustrated here. The initial condition means</a:t>
+            </a:r>
+            <a:r>
+              <a:rPr lang="en-US" sz="1200" kern="1200" baseline="0" dirty="0" smtClean="0">
+                <a:solidFill>
+                  <a:schemeClr val="tx1"/>
+                </a:solidFill>
+                <a:effectLst/>
+                <a:latin typeface="+mn-lt"/>
+                <a:ea typeface="+mn-ea"/>
+                <a:cs typeface="+mn-cs"/>
+              </a:rPr>
+              <a:t> the supply of heat demand in all</a:t>
+            </a:r>
+            <a:r>
+              <a:rPr lang="en-US" sz="1200" kern="1200" dirty="0" smtClean="0">
+                <a:solidFill>
+                  <a:schemeClr val="tx1"/>
+                </a:solidFill>
+                <a:effectLst/>
+                <a:latin typeface="+mn-lt"/>
+                <a:ea typeface="+mn-ea"/>
+                <a:cs typeface="+mn-cs"/>
+              </a:rPr>
+              <a:t> 75 communities.</a:t>
+            </a:r>
+            <a:r>
+              <a:rPr lang="en-US" sz="1200" kern="1200" baseline="0" dirty="0" smtClean="0">
+                <a:solidFill>
+                  <a:schemeClr val="tx1"/>
+                </a:solidFill>
+                <a:effectLst/>
+                <a:latin typeface="+mn-lt"/>
+                <a:ea typeface="+mn-ea"/>
+                <a:cs typeface="+mn-cs"/>
+              </a:rPr>
+              <a:t> This large</a:t>
+            </a:r>
+            <a:r>
+              <a:rPr lang="en-US" sz="1200" kern="1200" dirty="0" smtClean="0">
+                <a:solidFill>
+                  <a:schemeClr val="tx1"/>
+                </a:solidFill>
+                <a:effectLst/>
+                <a:latin typeface="+mn-lt"/>
+                <a:ea typeface="+mn-ea"/>
+                <a:cs typeface="+mn-cs"/>
+              </a:rPr>
+              <a:t> supply area results in a difficult network topology</a:t>
+            </a:r>
+            <a:r>
+              <a:rPr lang="en-US" sz="1200" kern="1200" baseline="0" dirty="0" smtClean="0">
+                <a:solidFill>
+                  <a:schemeClr val="tx1"/>
+                </a:solidFill>
+                <a:effectLst/>
+                <a:latin typeface="+mn-lt"/>
+                <a:ea typeface="+mn-ea"/>
+                <a:cs typeface="+mn-cs"/>
+              </a:rPr>
+              <a:t> since communities are connected with low heat densities</a:t>
+            </a:r>
+            <a:r>
+              <a:rPr lang="en-US" sz="1200" kern="1200" dirty="0" smtClean="0">
+                <a:solidFill>
+                  <a:schemeClr val="tx1"/>
+                </a:solidFill>
+                <a:effectLst/>
+                <a:latin typeface="+mn-lt"/>
+                <a:ea typeface="+mn-ea"/>
+                <a:cs typeface="+mn-cs"/>
+              </a:rPr>
+              <a:t>. This results in a low benchmark indicator value of the network. As you can see, our downscaling algorithm improves the network topology by reallocation of the centralized heat supply. The smaller supply area in the final condition has a higher benchmark indicator values and includes 47</a:t>
+            </a:r>
+            <a:r>
+              <a:rPr lang="en-US" sz="1200" kern="1200" baseline="0" dirty="0" smtClean="0">
+                <a:solidFill>
+                  <a:schemeClr val="tx1"/>
+                </a:solidFill>
+                <a:effectLst/>
+                <a:latin typeface="+mn-lt"/>
+                <a:ea typeface="+mn-ea"/>
+                <a:cs typeface="+mn-cs"/>
+              </a:rPr>
+              <a:t> communities</a:t>
+            </a:r>
+            <a:r>
+              <a:rPr lang="en-US" sz="1200" kern="1200" dirty="0" smtClean="0">
+                <a:solidFill>
+                  <a:schemeClr val="tx1"/>
+                </a:solidFill>
+                <a:effectLst/>
+                <a:latin typeface="+mn-lt"/>
+                <a:ea typeface="+mn-ea"/>
+                <a:cs typeface="+mn-cs"/>
+              </a:rPr>
+              <a:t>. The improvement of the network topology results in reduction of the population connected (-13.3%)</a:t>
+            </a:r>
+            <a:r>
+              <a:rPr lang="en-US" sz="1200" kern="1200" baseline="0" dirty="0" smtClean="0">
+                <a:solidFill>
+                  <a:schemeClr val="tx1"/>
+                </a:solidFill>
+                <a:effectLst/>
+                <a:latin typeface="+mn-lt"/>
+                <a:ea typeface="+mn-ea"/>
+                <a:cs typeface="+mn-cs"/>
+              </a:rPr>
+              <a:t> </a:t>
+            </a:r>
+            <a:r>
+              <a:rPr lang="en-US" sz="1200" kern="1200" dirty="0" smtClean="0">
+                <a:solidFill>
+                  <a:schemeClr val="tx1"/>
+                </a:solidFill>
+                <a:effectLst/>
+                <a:latin typeface="+mn-lt"/>
+                <a:ea typeface="+mn-ea"/>
+                <a:cs typeface="+mn-cs"/>
+              </a:rPr>
+              <a:t>to the network, as you can see at the bottom right. </a:t>
+            </a:r>
           </a:p>
         </p:txBody>
       </p:sp>
@@ -1482,6 +2206,22 @@
           <a:bodyPr/>
           <a:lstStyle/>
           <a:p>
+            <a:r>
+              <a:rPr lang="en-US" dirty="0" smtClean="0"/>
+              <a:t>This figure shows the heat density of the</a:t>
+            </a:r>
+            <a:r>
+              <a:rPr lang="en-US" baseline="0" dirty="0" smtClean="0"/>
+              <a:t> NUTS3 sub-region Graz 2050 in the Techno-Friendly scenario. As you can see by the waterfall diagram, the different downscaling techniques significantly increase the estimates of the heat density. We obtain for the specific region in the Techno-Friendly scenario a heat density of the district heating network for more than 2.5 </a:t>
+            </a:r>
+            <a:r>
+              <a:rPr lang="en-US" baseline="0" dirty="0" err="1" smtClean="0"/>
+              <a:t>GWh</a:t>
+            </a:r>
+            <a:r>
+              <a:rPr lang="en-US" baseline="0" dirty="0" smtClean="0"/>
+              <a:t> per square kilometer. However, the pink bar indicates the gap of heat density between the projection of 2050 and the today’s networks. This gap is the smallest in the Techno-Friendly, why we used this scenario here for the waterfall, and the largest in the Societal Commitment scenario. The difference of the heat density gap between the scenarios is indicated by the gray bar and the different markers. </a:t>
+            </a:r>
             <a:endParaRPr lang="en-US" dirty="0"/>
           </a:p>
         </p:txBody>
@@ -11149,6 +11889,14 @@
   <p:clrMapOvr>
     <a:masterClrMapping/>
   </p:clrMapOvr>
+  <mc:AlternateContent xmlns:mc="http://schemas.openxmlformats.org/markup-compatibility/2006" xmlns:p14="http://schemas.microsoft.com/office/powerpoint/2010/main">
+    <mc:Choice Requires="p14">
+      <p:transition spd="slow" p14:dur="2000"/>
+    </mc:Choice>
+    <mc:Fallback xmlns="">
+      <p:transition spd="slow"/>
+    </mc:Fallback>
+  </mc:AlternateContent>
   <p:timing>
     <p:tnLst>
       <p:par>
@@ -11235,7 +11983,7 @@
                 </a:solidFill>
                 <a:sym typeface="Wingdings" panose="05000000000000000000" pitchFamily="2" charset="2"/>
               </a:rPr>
-              <a:t>Disaggregating </a:t>
+              <a:t>Downscaling values of </a:t>
             </a:r>
             <a:r>
               <a:rPr lang="en-US" dirty="0">
@@ -11246,7 +11994,7 @@
                 </a:solidFill>
                 <a:sym typeface="Wingdings" panose="05000000000000000000" pitchFamily="2" charset="2"/>
               </a:rPr>
-              <a:t>values of the </a:t>
+              <a:t>the </a:t>
             </a:r>
             <a:r>
               <a:rPr lang="en-US" b="1" dirty="0">
@@ -11279,7 +12027,7 @@
                 </a:solidFill>
                 <a:sym typeface="Wingdings" panose="05000000000000000000" pitchFamily="2" charset="2"/>
               </a:rPr>
-              <a:t>advanced downscaling </a:t>
+              <a:t>advanced </a:t>
             </a:r>
             <a:r>
               <a:rPr lang="en-US" b="1" dirty="0" smtClean="0">
@@ -11301,7 +12049,7 @@
                 </a:solidFill>
                 <a:sym typeface="Wingdings" panose="05000000000000000000" pitchFamily="2" charset="2"/>
               </a:rPr>
-              <a:t> than proportional downscaling (e.g., the population as a proxy)</a:t>
+              <a:t> than proportional downscaling </a:t>
             </a:r>
           </a:p>
           <a:p>
@@ -11318,7 +12066,7 @@
                 </a:solidFill>
                 <a:sym typeface="Wingdings" panose="05000000000000000000" pitchFamily="2" charset="2"/>
               </a:rPr>
-              <a:t>Otherwise, misinterpretation of cost-minimal solutions supplying the heat demand and </a:t>
+              <a:t>Otherwise, misinterpretation of heat generation portfolios and </a:t>
             </a:r>
             <a:r>
               <a:rPr lang="en-US" b="1" dirty="0" smtClean="0">
@@ -11379,7 +12127,7 @@
                 </a:solidFill>
                 <a:sym typeface="Wingdings" panose="05000000000000000000" pitchFamily="2" charset="2"/>
               </a:rPr>
-              <a:t>In particular, prioritized preferences and graph theory-based benchmarking can improve the meaningfulness of downscaled values of the heating sector</a:t>
+              <a:t>In particular, prioritized preferences and graph theory-based benchmarking can improve the projections of downscaled values of the heating sector</a:t>
             </a:r>
           </a:p>
           <a:p>
@@ -11462,7 +12210,7 @@
                 </a:solidFill>
                 <a:sym typeface="Wingdings" panose="05000000000000000000" pitchFamily="2" charset="2"/>
               </a:rPr>
-              <a:t> compared to today’s networks is expected by 2050</a:t>
+              <a:t> compared to today’s networks is expected by 2050 (heat density gap)</a:t>
             </a:r>
           </a:p>
           <a:p>
@@ -11471,7 +12219,7 @@
               <a:buChar char="§"/>
             </a:pPr>
             <a:r>
-              <a:rPr lang="en-US" b="1" dirty="0">
+              <a:rPr lang="en-US" b="1" dirty="0" smtClean="0">
                 <a:solidFill>
                   <a:schemeClr val="bg1">
                     <a:lumMod val="50000"/>
@@ -11482,7 +12230,7 @@
               <a:t>Incentives</a:t>
             </a:r>
             <a:r>
-              <a:rPr lang="en-US" dirty="0">
+              <a:rPr lang="en-US" dirty="0" smtClean="0">
                 <a:solidFill>
                   <a:schemeClr val="bg1">
                     <a:lumMod val="50000"/>
@@ -11490,10 +12238,10 @@
                 </a:solidFill>
                 <a:sym typeface="Wingdings" panose="05000000000000000000" pitchFamily="2" charset="2"/>
               </a:rPr>
-              <a:t> for </a:t>
-            </a:r>
-            <a:r>
-              <a:rPr lang="en-US" dirty="0" smtClean="0">
+              <a:t> to </a:t>
+            </a:r>
+            <a:r>
+              <a:rPr lang="en-US" b="1" dirty="0" smtClean="0">
                 <a:solidFill>
                   <a:schemeClr val="bg1">
                     <a:lumMod val="50000"/>
@@ -11501,10 +12249,10 @@
                 </a:solidFill>
                 <a:sym typeface="Wingdings" panose="05000000000000000000" pitchFamily="2" charset="2"/>
               </a:rPr>
-              <a:t>heat supply companies </a:t>
-            </a:r>
-            <a:r>
-              <a:rPr lang="en-US" dirty="0">
+              <a:t>provide</a:t>
+            </a:r>
+            <a:r>
+              <a:rPr lang="en-US" dirty="0" smtClean="0">
                 <a:solidFill>
                   <a:schemeClr val="bg1">
                     <a:lumMod val="50000"/>
@@ -11512,10 +12260,10 @@
                 </a:solidFill>
                 <a:sym typeface="Wingdings" panose="05000000000000000000" pitchFamily="2" charset="2"/>
               </a:rPr>
-              <a:t>are likely to become necessary to ensure that they </a:t>
-            </a:r>
-            <a:r>
-              <a:rPr lang="en-US" b="1" dirty="0">
+              <a:t> heat network </a:t>
+            </a:r>
+            <a:r>
+              <a:rPr lang="en-US" b="1" dirty="0" smtClean="0">
                 <a:solidFill>
                   <a:schemeClr val="bg1">
                     <a:lumMod val="50000"/>
@@ -11523,10 +12271,10 @@
                 </a:solidFill>
                 <a:sym typeface="Wingdings" panose="05000000000000000000" pitchFamily="2" charset="2"/>
               </a:rPr>
-              <a:t>provide</a:t>
-            </a:r>
-            <a:r>
-              <a:rPr lang="en-US" dirty="0">
+              <a:t>infrastructure</a:t>
+            </a:r>
+            <a:r>
+              <a:rPr lang="en-US" dirty="0" smtClean="0">
                 <a:solidFill>
                   <a:schemeClr val="bg1">
                     <a:lumMod val="50000"/>
@@ -11534,10 +12282,10 @@
                 </a:solidFill>
                 <a:sym typeface="Wingdings" panose="05000000000000000000" pitchFamily="2" charset="2"/>
               </a:rPr>
-              <a:t> </a:t>
-            </a:r>
-            <a:r>
-              <a:rPr lang="en-US" dirty="0" smtClean="0">
+              <a:t> are </a:t>
+            </a:r>
+            <a:r>
+              <a:rPr lang="en-US" dirty="0">
                 <a:solidFill>
                   <a:schemeClr val="bg1">
                     <a:lumMod val="50000"/>
@@ -11545,10 +12293,10 @@
                 </a:solidFill>
                 <a:sym typeface="Wingdings" panose="05000000000000000000" pitchFamily="2" charset="2"/>
               </a:rPr>
-              <a:t>heat network </a:t>
-            </a:r>
-            <a:r>
-              <a:rPr lang="en-US" b="1" dirty="0" smtClean="0">
+              <a:t>likely </a:t>
+            </a:r>
+            <a:r>
+              <a:rPr lang="en-US" dirty="0" smtClean="0">
                 <a:solidFill>
                   <a:schemeClr val="bg1">
                     <a:lumMod val="50000"/>
@@ -11556,34 +12304,8 @@
                 </a:solidFill>
                 <a:sym typeface="Wingdings" panose="05000000000000000000" pitchFamily="2" charset="2"/>
               </a:rPr>
-              <a:t>infrastructure</a:t>
-            </a:r>
-            <a:r>
-              <a:rPr lang="en-US" dirty="0" smtClean="0">
-                <a:solidFill>
-                  <a:schemeClr val="bg1">
-                    <a:lumMod val="50000"/>
-                  </a:schemeClr>
-                </a:solidFill>
-                <a:sym typeface="Wingdings" panose="05000000000000000000" pitchFamily="2" charset="2"/>
-              </a:rPr>
-              <a:t> for high efficient and local usage of heat sources</a:t>
-            </a:r>
-          </a:p>
-          <a:p>
-            <a:pPr marL="342900" indent="-342900">
-              <a:buFont typeface="Wingdings" panose="05000000000000000000" pitchFamily="2" charset="2"/>
-              <a:buChar char="§"/>
-            </a:pPr>
-            <a:endParaRPr lang="en-US" dirty="0" smtClean="0">
-              <a:sym typeface="Wingdings" panose="05000000000000000000" pitchFamily="2" charset="2"/>
-            </a:endParaRPr>
-          </a:p>
-          <a:p>
-            <a:pPr marL="342900" indent="-342900">
-              <a:buFont typeface="Wingdings" panose="05000000000000000000" pitchFamily="2" charset="2"/>
-              <a:buChar char="§"/>
-            </a:pPr>
+              <a:t>be needed in areas which today would not be connected/supplied today</a:t>
+            </a:r>
             <a:endParaRPr lang="en-US" dirty="0" smtClean="0">
               <a:sym typeface="Wingdings" panose="05000000000000000000" pitchFamily="2" charset="2"/>
             </a:endParaRPr>
@@ -11623,6 +12345,14 @@
   <p:clrMapOvr>
     <a:masterClrMapping/>
   </p:clrMapOvr>
+  <mc:AlternateContent xmlns:mc="http://schemas.openxmlformats.org/markup-compatibility/2006" xmlns:p14="http://schemas.microsoft.com/office/powerpoint/2010/main">
+    <mc:Choice Requires="p14">
+      <p:transition spd="slow" p14:dur="2000"/>
+    </mc:Choice>
+    <mc:Fallback xmlns="">
+      <p:transition spd="slow"/>
+    </mc:Fallback>
+  </mc:AlternateContent>
   <p:timing>
     <p:tnLst>
       <p:par>
@@ -12219,6 +12949,14 @@
   <p:clrMapOvr>
     <a:masterClrMapping/>
   </p:clrMapOvr>
+  <mc:AlternateContent xmlns:mc="http://schemas.openxmlformats.org/markup-compatibility/2006" xmlns:p14="http://schemas.microsoft.com/office/powerpoint/2010/main">
+    <mc:Choice Requires="p14">
+      <p:transition spd="slow" p14:dur="2000"/>
+    </mc:Choice>
+    <mc:Fallback xmlns="">
+      <p:transition spd="slow"/>
+    </mc:Fallback>
+  </mc:AlternateContent>
   <p:timing>
     <p:tnLst>
       <p:par>
@@ -12365,7 +13103,7 @@
                       </a:schemeClr>
                     </a:solidFill>
                   </a:rPr>
-                  <a:t> - but fossil fuels continue to dominant the provision of heating and cooling services there as well</a:t>
+                  <a:t> - but fossil fuels continue to dominant the provision of heating and cooling services here as well</a:t>
                 </a:r>
               </a:p>
               <a:p>
@@ -12569,7 +13307,7 @@
                       </a:schemeClr>
                     </a:solidFill>
                   </a:rPr>
-                  <a:t>energy carriers (e.g., biomass/waste, hydrogen, etc.)</a:t>
+                  <a:t>renewable heat sources (e.g., biomass/waste, hydrogen)</a:t>
                 </a:r>
               </a:p>
               <a:p>
@@ -12585,47 +13323,7 @@
                       </a:schemeClr>
                     </a:solidFill>
                   </a:rPr>
-                  <a:t>…achieve </a:t>
-                </a:r>
-                <a:r>
-                  <a:rPr lang="en-US" dirty="0">
-                    <a:solidFill>
-                      <a:schemeClr val="bg1">
-                        <a:lumMod val="50000"/>
-                      </a:schemeClr>
-                    </a:solidFill>
-                  </a:rPr>
-                  <a:t>the necessary </a:t>
-                </a:r>
-                <a:r>
-                  <a:rPr lang="en-US" dirty="0" smtClean="0">
-                    <a:solidFill>
-                      <a:schemeClr val="bg1">
-                        <a:lumMod val="50000"/>
-                      </a:schemeClr>
-                    </a:solidFill>
-                  </a:rPr>
-                  <a:t>retrofitting rate </a:t>
-                </a:r>
-                <a:r>
-                  <a:rPr lang="en-US" dirty="0">
-                    <a:solidFill>
-                      <a:schemeClr val="bg1">
-                        <a:lumMod val="50000"/>
-                      </a:schemeClr>
-                    </a:solidFill>
-                  </a:rPr>
-                  <a:t>at </a:t>
-                </a:r>
-                <a:r>
-                  <a:rPr lang="en-US" dirty="0" smtClean="0">
-                    <a:solidFill>
-                      <a:schemeClr val="bg1">
-                        <a:lumMod val="50000"/>
-                      </a:schemeClr>
-                    </a:solidFill>
-                  </a:rPr>
-                  <a:t>all</a:t>
+                  <a:t>…achieve significant retrofitting rates by high connection rates </a:t>
                 </a:r>
               </a:p>
               <a:p>
@@ -12641,7 +13339,7 @@
                       </a:schemeClr>
                     </a:solidFill>
                   </a:rPr>
-                  <a:t>…unburden the electricity sector</a:t>
+                  <a:t>…unburden the electricity sector (high electrification of different energy service needs)</a:t>
                 </a:r>
               </a:p>
               <a:p>
@@ -12938,6 +13636,14 @@
   <p:clrMapOvr>
     <a:masterClrMapping/>
   </p:clrMapOvr>
+  <mc:AlternateContent xmlns:mc="http://schemas.openxmlformats.org/markup-compatibility/2006" xmlns:p14="http://schemas.microsoft.com/office/powerpoint/2010/main">
+    <mc:Choice Requires="p14">
+      <p:transition spd="slow" p14:dur="2000"/>
+    </mc:Choice>
+    <mc:Fallback xmlns="">
+      <p:transition spd="slow"/>
+    </mc:Fallback>
+  </mc:AlternateContent>
   <p:timing>
     <p:tnLst>
       <p:par>
@@ -13014,7 +13720,7 @@
                       </a:schemeClr>
                     </a:solidFill>
                   </a:rPr>
-                  <a:t> of the heating sector, taking into account the infrastructure/network requirements of heat generation technologies/sources from the country to the local level.</a:t>
+                  <a:t> of the heating sector, taking into account the infrastructure/network requirements of heat generation technologies/sources, from the country to the community level.</a:t>
                 </a:r>
               </a:p>
               <a:p>
@@ -13062,27 +13768,7 @@
                       </a:schemeClr>
                     </a:solidFill>
                   </a:rPr>
-                  <a:t>An Austrian case study </a:t>
-                </a:r>
-                <a:r>
-                  <a:rPr lang="en-US" smtClean="0">
-                    <a:solidFill>
-                      <a:schemeClr val="bg1">
-                        <a:lumMod val="50000"/>
-                      </a:schemeClr>
-                    </a:solidFill>
-                  </a:rPr>
-                  <a:t>is conducted, </a:t>
-                </a:r>
-                <a:r>
-                  <a:rPr lang="en-US" dirty="0" smtClean="0">
-                    <a:solidFill>
-                      <a:schemeClr val="bg1">
-                        <a:lumMod val="50000"/>
-                      </a:schemeClr>
-                    </a:solidFill>
-                  </a:rPr>
-                  <a:t>downscaling cost-minimized energy generation mix solutions of the heating sector in </a:t>
+                  <a:t>An Austrian case study is conducted, downscaling cost-minimizing heat generation portfolios </a:t>
                 </a:r>
                 <a14:m>
                   <m:oMath xmlns:m="http://schemas.openxmlformats.org/officeDocument/2006/math">
@@ -13127,7 +13813,7 @@
                       </a:schemeClr>
                     </a:solidFill>
                   </a:rPr>
-                  <a:t>, from the country to the community level. </a:t>
+                  <a:t>, from the country to the grid level. </a:t>
                 </a:r>
               </a:p>
             </p:txBody>
@@ -13146,9 +13832,9 @@
             </p:nvSpPr>
             <p:spPr>
               <a:blipFill>
-                <a:blip r:embed="rId3"/>
+                <a:blip r:embed="rId5"/>
                 <a:stretch>
-                  <a:fillRect l="-518" t="-810" r="-806"/>
+                  <a:fillRect l="-518" t="-810" r="-1267"/>
                 </a:stretch>
               </a:blipFill>
             </p:spPr>
@@ -13263,8 +13949,8 @@
         </p:nvSpPr>
         <p:spPr>
           <a:xfrm>
-            <a:off x="6924430" y="6015003"/>
-            <a:ext cx="5049895" cy="738664"/>
+            <a:off x="2251710" y="6195080"/>
+            <a:ext cx="9722615" cy="523220"/>
           </a:xfrm>
           <a:prstGeom prst="rect">
             <a:avLst/>
@@ -13305,7 +13991,7 @@
                     <a:lumMod val="65000"/>
                   </a:schemeClr>
                 </a:solidFill>
-                <a:hlinkClick r:id="rId4"/>
+                <a:hlinkClick r:id="rId6"/>
               </a:rPr>
               <a:t>openENTRANCE</a:t>
             </a:r>
@@ -13317,17 +14003,21 @@
                   </a:schemeClr>
                 </a:solidFill>
               </a:rPr>
-              <a:t> </a:t>
-            </a:r>
-            <a:br>
-              <a:rPr lang="en-US" sz="1400" dirty="0" smtClean="0">
+              <a:t> aiming for the 1.5/2.0°C global warming climate target</a:t>
+            </a:r>
+          </a:p>
+          <a:p>
+            <a:pPr algn="r"/>
+            <a:r>
+              <a:rPr lang="en-US" sz="1400" baseline="30000" dirty="0" smtClean="0">
                 <a:solidFill>
                   <a:schemeClr val="bg1">
                     <a:lumMod val="65000"/>
                   </a:schemeClr>
                 </a:solidFill>
               </a:rPr>
-            </a:br>
+              <a:t>2</a:t>
+            </a:r>
             <a:r>
               <a:rPr lang="en-US" sz="1400" dirty="0" smtClean="0">
                 <a:solidFill>
@@ -13336,20 +14026,17 @@
                   </a:schemeClr>
                 </a:solidFill>
               </a:rPr>
-              <a:t>aiming for the 1.5/2.0°C global warming climate target</a:t>
-            </a:r>
-          </a:p>
-          <a:p>
-            <a:pPr algn="r"/>
-            <a:r>
-              <a:rPr lang="en-US" sz="1400" baseline="30000" dirty="0" smtClean="0">
+              <a:t>Löffler et al., </a:t>
+            </a:r>
+            <a:r>
+              <a:rPr lang="en-US" sz="1400" i="1" dirty="0" smtClean="0">
                 <a:solidFill>
                   <a:schemeClr val="bg1">
                     <a:lumMod val="65000"/>
                   </a:schemeClr>
                 </a:solidFill>
               </a:rPr>
-              <a:t>2</a:t>
+              <a:t>Energies</a:t>
             </a:r>
             <a:r>
               <a:rPr lang="en-US" sz="1400" dirty="0" smtClean="0">
@@ -13359,56 +14046,36 @@
                   </a:schemeClr>
                 </a:solidFill>
               </a:rPr>
-              <a:t>Löffler et al., </a:t>
-            </a:r>
-            <a:r>
-              <a:rPr lang="en-US" sz="1400" i="1" dirty="0" smtClean="0">
+              <a:t>, (2017). </a:t>
+            </a:r>
+            <a:r>
+              <a:rPr lang="en-US" sz="1400" dirty="0" err="1" smtClean="0">
                 <a:solidFill>
                   <a:schemeClr val="bg1">
                     <a:lumMod val="65000"/>
                   </a:schemeClr>
                 </a:solidFill>
               </a:rPr>
-              <a:t>Energies</a:t>
-            </a:r>
-            <a:r>
-              <a:rPr lang="en-US" sz="1400" dirty="0" smtClean="0">
+              <a:t>doi</a:t>
+            </a:r>
+            <a:r>
+              <a:rPr lang="en-US" sz="1400" dirty="0">
                 <a:solidFill>
                   <a:schemeClr val="bg1">
                     <a:lumMod val="65000"/>
                   </a:schemeClr>
                 </a:solidFill>
               </a:rPr>
-              <a:t>, (2017). </a:t>
-            </a:r>
-            <a:r>
-              <a:rPr lang="en-US" sz="1400" dirty="0" err="1" smtClean="0">
+              <a:t>: </a:t>
+            </a:r>
+            <a:r>
+              <a:rPr lang="en-US" sz="1400" dirty="0">
                 <a:solidFill>
                   <a:schemeClr val="bg1">
                     <a:lumMod val="65000"/>
                   </a:schemeClr>
                 </a:solidFill>
-              </a:rPr>
-              <a:t>doi</a:t>
-            </a:r>
-            <a:r>
-              <a:rPr lang="en-US" sz="1400" dirty="0">
-                <a:solidFill>
-                  <a:schemeClr val="bg1">
-                    <a:lumMod val="65000"/>
-                  </a:schemeClr>
-                </a:solidFill>
-              </a:rPr>
-              <a:t>: </a:t>
-            </a:r>
-            <a:r>
-              <a:rPr lang="en-US" sz="1400" dirty="0">
-                <a:solidFill>
-                  <a:schemeClr val="bg1">
-                    <a:lumMod val="65000"/>
-                  </a:schemeClr>
-                </a:solidFill>
-                <a:hlinkClick r:id="rId5"/>
+                <a:hlinkClick r:id="rId7"/>
               </a:rPr>
               <a:t>10.3390/en10101468</a:t>
             </a:r>
@@ -13432,6 +14099,14 @@
   <p:clrMapOvr>
     <a:masterClrMapping/>
   </p:clrMapOvr>
+  <mc:AlternateContent xmlns:mc="http://schemas.openxmlformats.org/markup-compatibility/2006" xmlns:p14="http://schemas.microsoft.com/office/powerpoint/2010/main">
+    <mc:Choice Requires="p14">
+      <p:transition spd="slow" p14:dur="2000"/>
+    </mc:Choice>
+    <mc:Fallback xmlns="">
+      <p:transition spd="slow"/>
+    </mc:Fallback>
+  </mc:AlternateContent>
   <p:timing>
     <p:tnLst>
       <p:par>
@@ -13471,8 +14146,8 @@
         </p:nvSpPr>
         <p:spPr>
           <a:xfrm>
-            <a:off x="362712" y="1305715"/>
-            <a:ext cx="10591185" cy="4518071"/>
+            <a:off x="362712" y="3161056"/>
+            <a:ext cx="10591185" cy="2760546"/>
           </a:xfrm>
         </p:spPr>
         <p:txBody>
@@ -13505,14 +14180,24 @@
               <a:buAutoNum type="arabicPeriod"/>
             </a:pPr>
             <a:r>
-              <a:rPr lang="en-US" dirty="0">
+              <a:rPr lang="en-US" b="1" dirty="0">
                 <a:solidFill>
                   <a:schemeClr val="bg1">
                     <a:lumMod val="50000"/>
                   </a:schemeClr>
                 </a:solidFill>
               </a:rPr>
-              <a:t>Proportional downscaling using population as a </a:t>
+              <a:t>Proportional downscaling </a:t>
+            </a:r>
+            <a:r>
+              <a:rPr lang="en-US" dirty="0">
+                <a:solidFill>
+                  <a:schemeClr val="bg1">
+                    <a:lumMod val="50000"/>
+                  </a:schemeClr>
+                </a:solidFill>
+              </a:rPr>
+              <a:t>using population as a </a:t>
             </a:r>
             <a:r>
               <a:rPr lang="en-US" dirty="0" smtClean="0">
@@ -13553,14 +14238,24 @@
               <a:buAutoNum type="arabicPeriod"/>
             </a:pPr>
             <a:r>
-              <a:rPr lang="en-US" dirty="0">
+              <a:rPr lang="en-US" b="1" dirty="0">
                 <a:solidFill>
                   <a:schemeClr val="bg1">
                     <a:lumMod val="50000"/>
                   </a:schemeClr>
                 </a:solidFill>
               </a:rPr>
-              <a:t>Sequential downscaling algorithm using population density and infrastructure requirements of heat technologies/sources as additional </a:t>
+              <a:t>Sequential downscaling </a:t>
+            </a:r>
+            <a:r>
+              <a:rPr lang="en-US" dirty="0">
+                <a:solidFill>
+                  <a:schemeClr val="bg1">
+                    <a:lumMod val="50000"/>
+                  </a:schemeClr>
+                </a:solidFill>
+              </a:rPr>
+              <a:t>algorithm using population density and infrastructure requirements of heat technologies/sources as additional </a:t>
             </a:r>
             <a:r>
               <a:rPr lang="en-US" dirty="0" smtClean="0">
@@ -13601,14 +14296,24 @@
               <a:buAutoNum type="arabicPeriod"/>
             </a:pPr>
             <a:r>
-              <a:rPr lang="en-US" dirty="0">
+              <a:rPr lang="en-US" b="1" dirty="0">
                 <a:solidFill>
                   <a:schemeClr val="bg1">
                     <a:lumMod val="50000"/>
                   </a:schemeClr>
                 </a:solidFill>
               </a:rPr>
-              <a:t>Iterative downscaling algorithm based on graph-theory </a:t>
+              <a:t>Iterative downscaling </a:t>
+            </a:r>
+            <a:r>
+              <a:rPr lang="en-US" dirty="0">
+                <a:solidFill>
+                  <a:schemeClr val="bg1">
+                    <a:lumMod val="50000"/>
+                  </a:schemeClr>
+                </a:solidFill>
+              </a:rPr>
+              <a:t>algorithm based on graph-theory </a:t>
             </a:r>
             <a:r>
               <a:rPr lang="en-US" dirty="0" smtClean="0">
@@ -13710,22 +14415,334 @@
           </p:cNvPicPr>
           <p:nvPr/>
         </p:nvPicPr>
-        <p:blipFill>
+        <p:blipFill rotWithShape="1">
           <a:blip r:embed="rId3"/>
-          <a:stretch>
-            <a:fillRect/>
-          </a:stretch>
+          <a:srcRect b="21375"/>
+          <a:stretch/>
         </p:blipFill>
         <p:spPr>
           <a:xfrm>
-            <a:off x="976887" y="4071815"/>
-            <a:ext cx="9762738" cy="2285948"/>
+            <a:off x="362712" y="1163183"/>
+            <a:ext cx="9762738" cy="1797321"/>
           </a:xfrm>
           <a:prstGeom prst="rect">
             <a:avLst/>
           </a:prstGeom>
         </p:spPr>
       </p:pic>
+      <p:sp>
+        <p:nvSpPr>
+          <p:cNvPr id="3" name="Geschweifte Klammer rechts 2"/>
+          <p:cNvSpPr/>
+          <p:nvPr/>
+        </p:nvSpPr>
+        <p:spPr>
+          <a:xfrm>
+            <a:off x="10125450" y="1221671"/>
+            <a:ext cx="465585" cy="1680344"/>
+          </a:xfrm>
+          <a:prstGeom prst="rightBrace">
+            <a:avLst/>
+          </a:prstGeom>
+          <a:ln w="12700">
+            <a:solidFill>
+              <a:schemeClr val="tx1"/>
+            </a:solidFill>
+          </a:ln>
+        </p:spPr>
+        <p:style>
+          <a:lnRef idx="1">
+            <a:schemeClr val="accent1"/>
+          </a:lnRef>
+          <a:fillRef idx="0">
+            <a:schemeClr val="accent1"/>
+          </a:fillRef>
+          <a:effectRef idx="0">
+            <a:schemeClr val="accent1"/>
+          </a:effectRef>
+          <a:fontRef idx="minor">
+            <a:schemeClr val="tx1"/>
+          </a:fontRef>
+        </p:style>
+        <p:txBody>
+          <a:bodyPr rtlCol="0" anchor="ctr"/>
+          <a:lstStyle/>
+          <a:p>
+            <a:pPr algn="ctr"/>
+            <a:endParaRPr lang="en-US"/>
+          </a:p>
+        </p:txBody>
+      </p:sp>
+      <p:sp>
+        <p:nvSpPr>
+          <p:cNvPr id="6" name="Textfeld 5"/>
+          <p:cNvSpPr txBox="1"/>
+          <p:nvPr/>
+        </p:nvSpPr>
+        <p:spPr>
+          <a:xfrm rot="16200000">
+            <a:off x="9715510" y="1877176"/>
+            <a:ext cx="2152103" cy="369332"/>
+          </a:xfrm>
+          <a:prstGeom prst="rect">
+            <a:avLst/>
+          </a:prstGeom>
+          <a:noFill/>
+        </p:spPr>
+        <p:txBody>
+          <a:bodyPr wrap="square" rtlCol="0">
+            <a:spAutoFit/>
+          </a:bodyPr>
+          <a:lstStyle/>
+          <a:p>
+            <a:pPr algn="ctr"/>
+            <a:r>
+              <a:rPr lang="en-US" dirty="0" smtClean="0"/>
+              <a:t>Spatial levels</a:t>
+            </a:r>
+            <a:endParaRPr lang="en-US" dirty="0"/>
+          </a:p>
+        </p:txBody>
+      </p:sp>
+      <p:sp>
+        <p:nvSpPr>
+          <p:cNvPr id="8" name="Textfeld 7"/>
+          <p:cNvSpPr txBox="1"/>
+          <p:nvPr/>
+        </p:nvSpPr>
+        <p:spPr>
+          <a:xfrm>
+            <a:off x="2743201" y="6274127"/>
+            <a:ext cx="9260978" cy="523220"/>
+          </a:xfrm>
+          <a:prstGeom prst="rect">
+            <a:avLst/>
+          </a:prstGeom>
+          <a:noFill/>
+        </p:spPr>
+        <p:txBody>
+          <a:bodyPr wrap="square" rtlCol="0">
+            <a:spAutoFit/>
+          </a:bodyPr>
+          <a:lstStyle/>
+          <a:p>
+            <a:pPr algn="r"/>
+            <a:r>
+              <a:rPr lang="en-US" sz="1400" dirty="0" smtClean="0">
+                <a:solidFill>
+                  <a:schemeClr val="bg1">
+                    <a:lumMod val="65000"/>
+                  </a:schemeClr>
+                </a:solidFill>
+              </a:rPr>
+              <a:t>The </a:t>
+            </a:r>
+            <a:r>
+              <a:rPr lang="en-US" sz="1400" dirty="0">
+                <a:solidFill>
+                  <a:schemeClr val="bg1">
+                    <a:lumMod val="65000"/>
+                  </a:schemeClr>
+                </a:solidFill>
+              </a:rPr>
+              <a:t>Nomenclature of Territorial Units for Statistics (NUTS) were created by Eurostat in order to define territorial units for the production of regional statistics across the European Union.</a:t>
+            </a:r>
+            <a:endParaRPr lang="en-US" sz="1400" i="1" dirty="0" smtClean="0">
+              <a:solidFill>
+                <a:schemeClr val="bg1">
+                  <a:lumMod val="65000"/>
+                </a:schemeClr>
+              </a:solidFill>
+            </a:endParaRPr>
+          </a:p>
+        </p:txBody>
+      </p:sp>
+      <p:sp>
+        <p:nvSpPr>
+          <p:cNvPr id="9" name="Geschweifte Klammer rechts 8"/>
+          <p:cNvSpPr/>
+          <p:nvPr/>
+        </p:nvSpPr>
+        <p:spPr>
+          <a:xfrm>
+            <a:off x="7994984" y="3599836"/>
+            <a:ext cx="316531" cy="627458"/>
+          </a:xfrm>
+          <a:prstGeom prst="rightBrace">
+            <a:avLst>
+              <a:gd name="adj1" fmla="val 14470"/>
+              <a:gd name="adj2" fmla="val 50000"/>
+            </a:avLst>
+          </a:prstGeom>
+          <a:ln w="19050">
+            <a:solidFill>
+              <a:schemeClr val="accent2"/>
+            </a:solidFill>
+          </a:ln>
+        </p:spPr>
+        <p:style>
+          <a:lnRef idx="1">
+            <a:schemeClr val="accent1"/>
+          </a:lnRef>
+          <a:fillRef idx="0">
+            <a:schemeClr val="accent1"/>
+          </a:fillRef>
+          <a:effectRef idx="0">
+            <a:schemeClr val="accent1"/>
+          </a:effectRef>
+          <a:fontRef idx="minor">
+            <a:schemeClr val="tx1"/>
+          </a:fontRef>
+        </p:style>
+        <p:txBody>
+          <a:bodyPr rtlCol="0" anchor="ctr"/>
+          <a:lstStyle/>
+          <a:p>
+            <a:pPr algn="ctr"/>
+            <a:endParaRPr lang="en-US"/>
+          </a:p>
+        </p:txBody>
+      </p:sp>
+      <p:sp>
+        <p:nvSpPr>
+          <p:cNvPr id="10" name="Textfeld 9"/>
+          <p:cNvSpPr txBox="1"/>
+          <p:nvPr/>
+        </p:nvSpPr>
+        <p:spPr>
+          <a:xfrm>
+            <a:off x="8018511" y="3759676"/>
+            <a:ext cx="2618855" cy="307777"/>
+          </a:xfrm>
+          <a:prstGeom prst="rect">
+            <a:avLst/>
+          </a:prstGeom>
+          <a:noFill/>
+        </p:spPr>
+        <p:txBody>
+          <a:bodyPr wrap="square" rtlCol="0">
+            <a:spAutoFit/>
+          </a:bodyPr>
+          <a:lstStyle/>
+          <a:p>
+            <a:pPr algn="ctr"/>
+            <a:r>
+              <a:rPr lang="en-US" sz="1400" dirty="0" smtClean="0">
+                <a:solidFill>
+                  <a:schemeClr val="accent2"/>
+                </a:solidFill>
+              </a:rPr>
+              <a:t>Reference technique</a:t>
+            </a:r>
+            <a:endParaRPr lang="en-US" sz="1400" dirty="0">
+              <a:solidFill>
+                <a:schemeClr val="accent2"/>
+              </a:solidFill>
+            </a:endParaRPr>
+          </a:p>
+        </p:txBody>
+      </p:sp>
+      <p:sp>
+        <p:nvSpPr>
+          <p:cNvPr id="12" name="Geschweifte Klammer rechts 11"/>
+          <p:cNvSpPr/>
+          <p:nvPr/>
+        </p:nvSpPr>
+        <p:spPr>
+          <a:xfrm>
+            <a:off x="10637366" y="4306338"/>
+            <a:ext cx="316531" cy="1615264"/>
+          </a:xfrm>
+          <a:prstGeom prst="rightBrace">
+            <a:avLst>
+              <a:gd name="adj1" fmla="val 14470"/>
+              <a:gd name="adj2" fmla="val 50000"/>
+            </a:avLst>
+          </a:prstGeom>
+          <a:ln w="19050">
+            <a:solidFill>
+              <a:schemeClr val="accent4"/>
+            </a:solidFill>
+          </a:ln>
+        </p:spPr>
+        <p:style>
+          <a:lnRef idx="1">
+            <a:schemeClr val="accent1"/>
+          </a:lnRef>
+          <a:fillRef idx="0">
+            <a:schemeClr val="accent1"/>
+          </a:fillRef>
+          <a:effectRef idx="0">
+            <a:schemeClr val="accent1"/>
+          </a:effectRef>
+          <a:fontRef idx="minor">
+            <a:schemeClr val="tx1"/>
+          </a:fontRef>
+        </p:style>
+        <p:txBody>
+          <a:bodyPr rtlCol="0" anchor="ctr"/>
+          <a:lstStyle/>
+          <a:p>
+            <a:pPr algn="ctr"/>
+            <a:endParaRPr lang="en-US"/>
+          </a:p>
+        </p:txBody>
+      </p:sp>
+      <p:sp>
+        <p:nvSpPr>
+          <p:cNvPr id="13" name="Textfeld 12"/>
+          <p:cNvSpPr txBox="1"/>
+          <p:nvPr/>
+        </p:nvSpPr>
+        <p:spPr>
+          <a:xfrm rot="16200000">
+            <a:off x="9890484" y="4964135"/>
+            <a:ext cx="2618855" cy="307777"/>
+          </a:xfrm>
+          <a:prstGeom prst="rect">
+            <a:avLst/>
+          </a:prstGeom>
+          <a:noFill/>
+        </p:spPr>
+        <p:txBody>
+          <a:bodyPr wrap="square" rtlCol="0">
+            <a:spAutoFit/>
+          </a:bodyPr>
+          <a:lstStyle/>
+          <a:p>
+            <a:pPr algn="ctr"/>
+            <a:r>
+              <a:rPr lang="en-US" sz="1400" dirty="0" smtClean="0">
+                <a:solidFill>
+                  <a:schemeClr val="accent4"/>
+                </a:solidFill>
+              </a:rPr>
+              <a:t>Techniques</a:t>
+            </a:r>
+            <a:r>
+              <a:rPr lang="en-US" sz="1400" dirty="0">
+                <a:solidFill>
+                  <a:schemeClr val="accent4"/>
+                </a:solidFill>
+              </a:rPr>
+              <a:t> </a:t>
+            </a:r>
+            <a:r>
+              <a:rPr lang="en-US" sz="1400" dirty="0" smtClean="0">
+                <a:solidFill>
+                  <a:schemeClr val="accent4"/>
+                </a:solidFill>
+              </a:rPr>
+              <a:t>developed</a:t>
+            </a:r>
+            <a:endParaRPr lang="en-US" sz="1400" dirty="0">
+              <a:solidFill>
+                <a:schemeClr val="accent4"/>
+              </a:solidFill>
+            </a:endParaRPr>
+          </a:p>
+        </p:txBody>
+      </p:sp>
     </p:spTree>
     <p:extLst>
       <p:ext uri="{BB962C8B-B14F-4D97-AF65-F5344CB8AC3E}">
@@ -13736,6 +14753,14 @@
   <p:clrMapOvr>
     <a:masterClrMapping/>
   </p:clrMapOvr>
+  <mc:AlternateContent xmlns:mc="http://schemas.openxmlformats.org/markup-compatibility/2006" xmlns:p14="http://schemas.microsoft.com/office/powerpoint/2010/main">
+    <mc:Choice Requires="p14">
+      <p:transition spd="slow" p14:dur="2000"/>
+    </mc:Choice>
+    <mc:Fallback xmlns="">
+      <p:transition spd="slow"/>
+    </mc:Fallback>
+  </mc:AlternateContent>
   <p:timing>
     <p:tnLst>
       <p:par>
@@ -14072,8 +15097,8 @@
         </p:blipFill>
         <p:spPr>
           <a:xfrm>
-            <a:off x="5976700" y="4611898"/>
-            <a:ext cx="4083556" cy="849536"/>
+            <a:off x="5972516" y="4299551"/>
+            <a:ext cx="5619128" cy="1168994"/>
           </a:xfrm>
           <a:prstGeom prst="rect">
             <a:avLst/>
@@ -14172,8 +15197,8 @@
         </p:blipFill>
         <p:spPr>
           <a:xfrm>
-            <a:off x="5976700" y="5519446"/>
-            <a:ext cx="3096720" cy="668086"/>
+            <a:off x="6001471" y="5404292"/>
+            <a:ext cx="4261204" cy="919312"/>
           </a:xfrm>
           <a:prstGeom prst="rect">
             <a:avLst/>
@@ -14210,6 +15235,36 @@
           </a:p>
         </p:txBody>
       </p:sp>
+      <p:pic>
+        <p:nvPicPr>
+          <p:cNvPr id="14" name="Grafik 13">
+            <a:extLst>
+              <a:ext uri="{FF2B5EF4-FFF2-40B4-BE49-F238E27FC236}">
+                <a16:creationId xmlns:a16="http://schemas.microsoft.com/office/drawing/2014/main" id="{43A7501B-6D4B-BF40-BF47-B468346D9A40}"/>
+              </a:ext>
+            </a:extLst>
+          </p:cNvPr>
+          <p:cNvPicPr>
+            <a:picLocks noChangeAspect="1"/>
+          </p:cNvPicPr>
+          <p:nvPr/>
+        </p:nvPicPr>
+        <p:blipFill>
+          <a:blip r:embed="rId5"/>
+          <a:stretch>
+            <a:fillRect/>
+          </a:stretch>
+        </p:blipFill>
+        <p:spPr>
+          <a:xfrm>
+            <a:off x="10060256" y="2229552"/>
+            <a:ext cx="1709757" cy="1086408"/>
+          </a:xfrm>
+          <a:prstGeom prst="rect">
+            <a:avLst/>
+          </a:prstGeom>
+        </p:spPr>
+      </p:pic>
     </p:spTree>
     <p:extLst>
       <p:ext uri="{BB962C8B-B14F-4D97-AF65-F5344CB8AC3E}">
@@ -14220,6 +15275,14 @@
   <p:clrMapOvr>
     <a:masterClrMapping/>
   </p:clrMapOvr>
+  <mc:AlternateContent xmlns:mc="http://schemas.openxmlformats.org/markup-compatibility/2006" xmlns:p14="http://schemas.microsoft.com/office/powerpoint/2010/main">
+    <mc:Choice Requires="p14">
+      <p:transition spd="slow" p14:dur="2000"/>
+    </mc:Choice>
+    <mc:Fallback xmlns="">
+      <p:transition spd="slow"/>
+    </mc:Fallback>
+  </mc:AlternateContent>
   <p:timing>
     <p:tnLst>
       <p:par>
@@ -14333,6 +15396,14 @@
   <p:clrMapOvr>
     <a:masterClrMapping/>
   </p:clrMapOvr>
+  <mc:AlternateContent xmlns:mc="http://schemas.openxmlformats.org/markup-compatibility/2006" xmlns:p14="http://schemas.microsoft.com/office/powerpoint/2010/main">
+    <mc:Choice Requires="p14">
+      <p:transition spd="slow" p14:dur="2000"/>
+    </mc:Choice>
+    <mc:Fallback xmlns="">
+      <p:transition spd="slow"/>
+    </mc:Fallback>
+  </mc:AlternateContent>
   <p:timing>
     <p:tnLst>
       <p:par>
@@ -14447,6 +15518,14 @@
   <p:clrMapOvr>
     <a:masterClrMapping/>
   </p:clrMapOvr>
+  <mc:AlternateContent xmlns:mc="http://schemas.openxmlformats.org/markup-compatibility/2006" xmlns:p14="http://schemas.microsoft.com/office/powerpoint/2010/main">
+    <mc:Choice Requires="p14">
+      <p:transition spd="slow" p14:dur="2000"/>
+    </mc:Choice>
+    <mc:Fallback xmlns="">
+      <p:transition spd="slow"/>
+    </mc:Fallback>
+  </mc:AlternateContent>
   <p:timing>
     <p:tnLst>
       <p:par>
@@ -14474,54 +15553,6 @@
           <a:chExt cx="0" cy="0"/>
         </a:xfrm>
       </p:grpSpPr>
-      <p:sp>
-        <p:nvSpPr>
-          <p:cNvPr id="2" name="Foliennummernplatzhalter 1"/>
-          <p:cNvSpPr>
-            <a:spLocks noGrp="1"/>
-          </p:cNvSpPr>
-          <p:nvPr>
-            <p:ph type="sldNum" sz="quarter" idx="11"/>
-          </p:nvPr>
-        </p:nvSpPr>
-        <p:spPr/>
-        <p:txBody>
-          <a:bodyPr/>
-          <a:lstStyle/>
-          <a:p>
-            <a:fld id="{838B0777-827F-8D42-90B1-61394C340E65}" type="slidenum">
-              <a:rPr lang="en-US" smtClean="0"/>
-              <a:pPr/>
-              <a:t>8</a:t>
-            </a:fld>
-            <a:endParaRPr lang="en-US" dirty="0"/>
-          </a:p>
-        </p:txBody>
-      </p:sp>
-      <p:sp>
-        <p:nvSpPr>
-          <p:cNvPr id="4" name="Fußzeilenplatzhalter 3"/>
-          <p:cNvSpPr>
-            <a:spLocks noGrp="1"/>
-          </p:cNvSpPr>
-          <p:nvPr>
-            <p:ph type="ftr" sz="quarter" idx="3"/>
-          </p:nvPr>
-        </p:nvSpPr>
-        <p:spPr/>
-        <p:txBody>
-          <a:bodyPr/>
-          <a:lstStyle/>
-          <a:p>
-            <a:pPr algn="ctr"/>
-            <a:r>
-              <a:rPr lang="en-US" dirty="0" smtClean="0"/>
-              <a:t>Results (3/4)</a:t>
-            </a:r>
-            <a:endParaRPr lang="en-GB" dirty="0"/>
-          </a:p>
-        </p:txBody>
-      </p:sp>
       <p:pic>
         <p:nvPicPr>
           <p:cNvPr id="5" name="Inhaltsplatzhalter 4"/>
@@ -14550,6 +15581,100 @@
           </a:xfrm>
         </p:spPr>
       </p:pic>
+      <p:sp>
+        <p:nvSpPr>
+          <p:cNvPr id="2" name="Foliennummernplatzhalter 1"/>
+          <p:cNvSpPr>
+            <a:spLocks noGrp="1"/>
+          </p:cNvSpPr>
+          <p:nvPr>
+            <p:ph type="sldNum" sz="quarter" idx="11"/>
+          </p:nvPr>
+        </p:nvSpPr>
+        <p:spPr/>
+        <p:txBody>
+          <a:bodyPr/>
+          <a:lstStyle/>
+          <a:p>
+            <a:fld id="{838B0777-827F-8D42-90B1-61394C340E65}" type="slidenum">
+              <a:rPr lang="en-US" smtClean="0"/>
+              <a:pPr/>
+              <a:t>8</a:t>
+            </a:fld>
+            <a:endParaRPr lang="en-US" dirty="0"/>
+          </a:p>
+        </p:txBody>
+      </p:sp>
+      <p:sp>
+        <p:nvSpPr>
+          <p:cNvPr id="4" name="Fußzeilenplatzhalter 3"/>
+          <p:cNvSpPr>
+            <a:spLocks noGrp="1"/>
+          </p:cNvSpPr>
+          <p:nvPr>
+            <p:ph type="ftr" sz="quarter" idx="3"/>
+          </p:nvPr>
+        </p:nvSpPr>
+        <p:spPr/>
+        <p:txBody>
+          <a:bodyPr/>
+          <a:lstStyle/>
+          <a:p>
+            <a:pPr algn="ctr"/>
+            <a:r>
+              <a:rPr lang="en-US" dirty="0" smtClean="0"/>
+              <a:t>Results (3/4)</a:t>
+            </a:r>
+            <a:endParaRPr lang="en-GB" dirty="0"/>
+          </a:p>
+        </p:txBody>
+      </p:sp>
+      <p:sp>
+        <p:nvSpPr>
+          <p:cNvPr id="3" name="Rechteck 2"/>
+          <p:cNvSpPr/>
+          <p:nvPr/>
+        </p:nvSpPr>
+        <p:spPr>
+          <a:xfrm>
+            <a:off x="3446585" y="1758461"/>
+            <a:ext cx="2451798" cy="1075174"/>
+          </a:xfrm>
+          <a:prstGeom prst="rect">
+            <a:avLst/>
+          </a:prstGeom>
+          <a:noFill/>
+          <a:ln w="19050">
+            <a:solidFill>
+              <a:srgbClr val="FF9900"/>
+            </a:solidFill>
+          </a:ln>
+        </p:spPr>
+        <p:style>
+          <a:lnRef idx="2">
+            <a:schemeClr val="accent1">
+              <a:shade val="50000"/>
+            </a:schemeClr>
+          </a:lnRef>
+          <a:fillRef idx="1">
+            <a:schemeClr val="accent1"/>
+          </a:fillRef>
+          <a:effectRef idx="0">
+            <a:schemeClr val="accent1"/>
+          </a:effectRef>
+          <a:fontRef idx="minor">
+            <a:schemeClr val="lt1"/>
+          </a:fontRef>
+        </p:style>
+        <p:txBody>
+          <a:bodyPr rtlCol="0" anchor="ctr"/>
+          <a:lstStyle/>
+          <a:p>
+            <a:pPr algn="ctr"/>
+            <a:endParaRPr lang="en-US"/>
+          </a:p>
+        </p:txBody>
+      </p:sp>
     </p:spTree>
     <p:extLst>
       <p:ext uri="{BB962C8B-B14F-4D97-AF65-F5344CB8AC3E}">
@@ -14560,6 +15685,14 @@
   <p:clrMapOvr>
     <a:masterClrMapping/>
   </p:clrMapOvr>
+  <mc:AlternateContent xmlns:mc="http://schemas.openxmlformats.org/markup-compatibility/2006" xmlns:p14="http://schemas.microsoft.com/office/powerpoint/2010/main">
+    <mc:Choice Requires="p14">
+      <p:transition spd="slow" p14:dur="2000"/>
+    </mc:Choice>
+    <mc:Fallback xmlns="">
+      <p:transition spd="slow"/>
+    </mc:Fallback>
+  </mc:AlternateContent>
   <p:timing>
     <p:tnLst>
       <p:par>
@@ -14663,6 +15796,72 @@
           </a:xfrm>
         </p:spPr>
       </p:pic>
+      <p:sp>
+        <p:nvSpPr>
+          <p:cNvPr id="6" name="Textfeld 5"/>
+          <p:cNvSpPr txBox="1"/>
+          <p:nvPr/>
+        </p:nvSpPr>
+        <p:spPr>
+          <a:xfrm>
+            <a:off x="2016370" y="6353175"/>
+            <a:ext cx="9957956" cy="307777"/>
+          </a:xfrm>
+          <a:prstGeom prst="rect">
+            <a:avLst/>
+          </a:prstGeom>
+          <a:noFill/>
+        </p:spPr>
+        <p:txBody>
+          <a:bodyPr wrap="square" rtlCol="0">
+            <a:spAutoFit/>
+          </a:bodyPr>
+          <a:lstStyle/>
+          <a:p>
+            <a:pPr algn="r"/>
+            <a:r>
+              <a:rPr lang="en-US" sz="1400" dirty="0" smtClean="0">
+                <a:solidFill>
+                  <a:schemeClr val="bg1">
+                    <a:lumMod val="65000"/>
+                  </a:schemeClr>
+                </a:solidFill>
+                <a:hlinkClick r:id="rId4"/>
+              </a:rPr>
+              <a:t>http</a:t>
+            </a:r>
+            <a:r>
+              <a:rPr lang="en-US" sz="1400" dirty="0">
+                <a:solidFill>
+                  <a:schemeClr val="bg1">
+                    <a:lumMod val="65000"/>
+                  </a:schemeClr>
+                </a:solidFill>
+                <a:hlinkClick r:id="rId4"/>
+              </a:rPr>
+              <a:t>://</a:t>
+            </a:r>
+            <a:r>
+              <a:rPr lang="en-US" sz="1400" dirty="0" smtClean="0">
+                <a:solidFill>
+                  <a:schemeClr val="bg1">
+                    <a:lumMod val="65000"/>
+                  </a:schemeClr>
+                </a:solidFill>
+                <a:hlinkClick r:id="rId4"/>
+              </a:rPr>
+              <a:t>www.austrian-heatmap.gv.at/karte/</a:t>
+            </a:r>
+            <a:endParaRPr lang="en-US" sz="1400" dirty="0" smtClean="0">
+              <a:solidFill>
+                <a:schemeClr val="bg1">
+                  <a:lumMod val="65000"/>
+                </a:schemeClr>
+              </a:solidFill>
+            </a:endParaRPr>
+          </a:p>
+        </p:txBody>
+      </p:sp>
     </p:spTree>
     <p:extLst>
       <p:ext uri="{BB962C8B-B14F-4D97-AF65-F5344CB8AC3E}">
@@ -14673,6 +15872,14 @@
   <p:clrMapOvr>
     <a:masterClrMapping/>
   </p:clrMapOvr>
+  <mc:AlternateContent xmlns:mc="http://schemas.openxmlformats.org/markup-compatibility/2006" xmlns:p14="http://schemas.microsoft.com/office/powerpoint/2010/main">
+    <mc:Choice Requires="p14">
+      <p:transition spd="slow" p14:dur="2000"/>
+    </mc:Choice>
+    <mc:Fallback xmlns="">
+      <p:transition spd="slow"/>
+    </mc:Fallback>
+  </mc:AlternateContent>
   <p:timing>
     <p:tnLst>
       <p:par>
@@ -16097,16 +17304,16 @@
 <ds:datastoreItem xmlns:ds="http://schemas.openxmlformats.org/officeDocument/2006/customXml" ds:itemID="{5AD93C57-A7ED-44E6-88BF-DA3984EE19E6}">
   <ds:schemaRefs>
     <ds:schemaRef ds:uri="http://purl.org/dc/elements/1.1/"/>
-    <ds:schemaRef ds:uri="06814371-4dd9-40ea-9cc7-40b39613c6ae"/>
-    <ds:schemaRef ds:uri="http://purl.org/dc/dcmitype/"/>
-    <ds:schemaRef ds:uri="http://schemas.microsoft.com/office/infopath/2007/PartnerControls"/>
-    <ds:schemaRef ds:uri="749ef8e9-4186-4c55-b2d4-b1c3f2fa9400"/>
-    <ds:schemaRef ds:uri="http://www.w3.org/XML/1998/namespace"/>
-    <ds:schemaRef ds:uri="http://schemas.microsoft.com/office/2006/documentManagement/types"/>
     <ds:schemaRef ds:uri="http://schemas.openxmlformats.org/package/2006/metadata/core-properties"/>
     <ds:schemaRef ds:uri="0689c177-5e19-464b-8532-40aa8fde3a94"/>
     <ds:schemaRef ds:uri="http://schemas.microsoft.com/office/2006/metadata/properties"/>
     <ds:schemaRef ds:uri="http://purl.org/dc/terms/"/>
+    <ds:schemaRef ds:uri="http://schemas.microsoft.com/office/infopath/2007/PartnerControls"/>
+    <ds:schemaRef ds:uri="http://www.w3.org/XML/1998/namespace"/>
+    <ds:schemaRef ds:uri="http://schemas.microsoft.com/office/2006/documentManagement/types"/>
+    <ds:schemaRef ds:uri="749ef8e9-4186-4c55-b2d4-b1c3f2fa9400"/>
+    <ds:schemaRef ds:uri="06814371-4dd9-40ea-9cc7-40b39613c6ae"/>
+    <ds:schemaRef ds:uri="http://purl.org/dc/dcmitype/"/>
   </ds:schemaRefs>
 </ds:datastoreItem>
 </file>

</xml_diff>